<commit_message>
Fixed code that was including a blank page at start of presentations with a theme
</commit_message>
<xml_diff>
--- a/static/PresentationThemes/Digital.pptx
+++ b/static/PresentationThemes/Digital.pptx
@@ -11,7 +11,7 @@
     <p:handoutMasterId r:id="rId7"/>
   </p:handoutMasterIdLst>
   <p:sldIdLst>
-    <p:sldId id="256" r:id="rId5"/>
+    <p:sldId id="257" r:id="rId5"/>
   </p:sldIdLst>
   <p:sldSz cx="12192000" cy="6858000"/>
   <p:notesSz cx="6858000" cy="9144000"/>
@@ -228,7 +228,7 @@
             <a:pPr rtl="0"/>
             <a:fld id="{D34942C2-9BB4-485B-BAA9-2B22AB8C8143}" type="datetime1">
               <a:rPr lang="en-GB" smtClean="0"/>
-              <a:t>15/03/2024</a:t>
+              <a:t>17/03/2024</a:t>
             </a:fld>
             <a:endParaRPr lang="en-GB"/>
           </a:p>
@@ -410,7 +410,7 @@
             <a:pPr rtl="0"/>
             <a:fld id="{C46B0483-5E48-4989-812C-4FF58E3186C6}" type="datetime1">
               <a:rPr lang="en-GB" noProof="0" smtClean="0"/>
-              <a:t>15/03/2024</a:t>
+              <a:t>17/03/2024</a:t>
             </a:fld>
             <a:endParaRPr lang="en-GB" noProof="0"/>
           </a:p>
@@ -681,92 +681,6 @@
 </p:notesMaster>
 </file>
 
-<file path=ppt/notesSlides/notesSlide1.xml><?xml version="1.0" encoding="utf-8"?>
-<p:notes xmlns:a="http://schemas.openxmlformats.org/drawingml/2006/main" xmlns:r="http://schemas.openxmlformats.org/officeDocument/2006/relationships" xmlns:p="http://schemas.openxmlformats.org/presentationml/2006/main">
-  <p:cSld>
-    <p:spTree>
-      <p:nvGrpSpPr>
-        <p:cNvPr id="1" name=""/>
-        <p:cNvGrpSpPr/>
-        <p:nvPr/>
-      </p:nvGrpSpPr>
-      <p:grpSpPr>
-        <a:xfrm>
-          <a:off x="0" y="0"/>
-          <a:ext cx="0" cy="0"/>
-          <a:chOff x="0" y="0"/>
-          <a:chExt cx="0" cy="0"/>
-        </a:xfrm>
-      </p:grpSpPr>
-      <p:sp>
-        <p:nvSpPr>
-          <p:cNvPr id="2" name="Slide Image Placeholder 1"/>
-          <p:cNvSpPr>
-            <a:spLocks noGrp="1" noRot="1" noChangeAspect="1"/>
-          </p:cNvSpPr>
-          <p:nvPr>
-            <p:ph type="sldImg"/>
-          </p:nvPr>
-        </p:nvSpPr>
-        <p:spPr/>
-      </p:sp>
-      <p:sp>
-        <p:nvSpPr>
-          <p:cNvPr id="3" name="Notes Placeholder 2"/>
-          <p:cNvSpPr>
-            <a:spLocks noGrp="1"/>
-          </p:cNvSpPr>
-          <p:nvPr>
-            <p:ph type="body" idx="1"/>
-          </p:nvPr>
-        </p:nvSpPr>
-        <p:spPr/>
-        <p:txBody>
-          <a:bodyPr rtlCol="0"/>
-          <a:lstStyle/>
-          <a:p>
-            <a:pPr rtl="0"/>
-            <a:endParaRPr lang="en-GB"/>
-          </a:p>
-        </p:txBody>
-      </p:sp>
-      <p:sp>
-        <p:nvSpPr>
-          <p:cNvPr id="4" name="Slide Number Placeholder 3"/>
-          <p:cNvSpPr>
-            <a:spLocks noGrp="1"/>
-          </p:cNvSpPr>
-          <p:nvPr>
-            <p:ph type="sldNum" sz="quarter" idx="5"/>
-          </p:nvPr>
-        </p:nvSpPr>
-        <p:spPr/>
-        <p:txBody>
-          <a:bodyPr rtlCol="0"/>
-          <a:lstStyle/>
-          <a:p>
-            <a:pPr rtl="0"/>
-            <a:fld id="{EE000EEB-8338-48D7-8EE8-EE0082EF7602}" type="slidenum">
-              <a:rPr lang="en-GB" smtClean="0"/>
-              <a:t>1</a:t>
-            </a:fld>
-            <a:endParaRPr lang="en-GB"/>
-          </a:p>
-        </p:txBody>
-      </p:sp>
-    </p:spTree>
-    <p:extLst>
-      <p:ext uri="{BB962C8B-B14F-4D97-AF65-F5344CB8AC3E}">
-        <p14:creationId xmlns:p14="http://schemas.microsoft.com/office/powerpoint/2010/main" val="4005338275"/>
-      </p:ext>
-    </p:extLst>
-  </p:cSld>
-  <p:clrMapOvr>
-    <a:masterClrMapping/>
-  </p:clrMapOvr>
-</p:notes>
-</file>
-
 <file path=ppt/slideLayouts/slideLayout1.xml><?xml version="1.0" encoding="utf-8"?>
 <p:sldLayout xmlns:a="http://schemas.openxmlformats.org/drawingml/2006/main" xmlns:r="http://schemas.openxmlformats.org/officeDocument/2006/relationships" xmlns:p="http://schemas.openxmlformats.org/presentationml/2006/main" type="title" preserve="1">
   <p:cSld name="Title Slide">
@@ -953,7 +867,7 @@
             <a:pPr rtl="0"/>
             <a:fld id="{6829274C-2AF6-43C6-BE37-6B723526AB66}" type="datetime1">
               <a:rPr lang="en-GB" noProof="0" smtClean="0"/>
-              <a:t>15/03/2024</a:t>
+              <a:t>17/03/2024</a:t>
             </a:fld>
             <a:endParaRPr lang="en-GB" noProof="0"/>
           </a:p>
@@ -1228,7 +1142,7 @@
             <a:pPr rtl="0"/>
             <a:fld id="{AC3B16FD-AF9A-4B37-B857-ABF0C7FEB2C0}" type="datetime1">
               <a:rPr lang="en-GB" noProof="0" smtClean="0"/>
-              <a:t>15/03/2024</a:t>
+              <a:t>17/03/2024</a:t>
             </a:fld>
             <a:endParaRPr lang="en-GB" noProof="0"/>
           </a:p>
@@ -1421,7 +1335,7 @@
             <a:pPr rtl="0"/>
             <a:fld id="{E8D02A09-1629-4FE8-9008-2360C6AF6524}" type="datetime1">
               <a:rPr lang="en-GB" noProof="0" smtClean="0"/>
-              <a:t>15/03/2024</a:t>
+              <a:t>17/03/2024</a:t>
             </a:fld>
             <a:endParaRPr lang="en-GB" noProof="0"/>
           </a:p>
@@ -1688,7 +1602,7 @@
             <a:pPr rtl="0"/>
             <a:fld id="{ACBF031D-5EAA-4834-BC4C-6B8D41D2A31A}" type="datetime1">
               <a:rPr lang="en-GB" noProof="0" smtClean="0"/>
-              <a:t>15/03/2024</a:t>
+              <a:t>17/03/2024</a:t>
             </a:fld>
             <a:endParaRPr lang="en-GB" noProof="0"/>
           </a:p>
@@ -2019,7 +1933,7 @@
             <a:pPr rtl="0"/>
             <a:fld id="{0C153F27-CCB5-42A9-917D-A5C19EF4A37A}" type="datetime1">
               <a:rPr lang="en-GB" noProof="0" smtClean="0"/>
-              <a:t>15/03/2024</a:t>
+              <a:t>17/03/2024</a:t>
             </a:fld>
             <a:endParaRPr lang="en-GB" noProof="0"/>
           </a:p>
@@ -2628,7 +2542,7 @@
             <a:pPr rtl="0"/>
             <a:fld id="{C22FEF4C-3D16-4233-ACC2-6B3BE0338E94}" type="datetime1">
               <a:rPr lang="en-GB" noProof="0" smtClean="0"/>
-              <a:t>15/03/2024</a:t>
+              <a:t>17/03/2024</a:t>
             </a:fld>
             <a:endParaRPr lang="en-GB" noProof="0"/>
           </a:p>
@@ -3477,7 +3391,7 @@
             <a:pPr rtl="0"/>
             <a:fld id="{236F4546-A12E-4834-AE1D-19A2BD9FE491}" type="datetime1">
               <a:rPr lang="en-GB" noProof="0" smtClean="0"/>
-              <a:t>15/03/2024</a:t>
+              <a:t>17/03/2024</a:t>
             </a:fld>
             <a:endParaRPr lang="en-GB" noProof="0"/>
           </a:p>
@@ -3646,7 +3560,7 @@
             <a:pPr rtl="0"/>
             <a:fld id="{FBFC8BA5-C8F4-44E9-81D3-9993FAFC2548}" type="datetime1">
               <a:rPr lang="en-GB" noProof="0" smtClean="0"/>
-              <a:t>15/03/2024</a:t>
+              <a:t>17/03/2024</a:t>
             </a:fld>
             <a:endParaRPr lang="en-GB" noProof="0"/>
           </a:p>
@@ -3825,7 +3739,7 @@
             <a:pPr rtl="0"/>
             <a:fld id="{A164976D-C0DD-4100-93A1-CFA745D94DB1}" type="datetime1">
               <a:rPr lang="en-GB" noProof="0" smtClean="0"/>
-              <a:t>15/03/2024</a:t>
+              <a:t>17/03/2024</a:t>
             </a:fld>
             <a:endParaRPr lang="en-GB" noProof="0"/>
           </a:p>
@@ -3994,7 +3908,7 @@
             <a:pPr rtl="0"/>
             <a:fld id="{2288F526-2C2E-4DB7-8655-C1E08D2E237C}" type="datetime1">
               <a:rPr lang="en-GB" noProof="0" smtClean="0"/>
-              <a:t>15/03/2024</a:t>
+              <a:t>17/03/2024</a:t>
             </a:fld>
             <a:endParaRPr lang="en-GB" noProof="0"/>
           </a:p>
@@ -4237,7 +4151,7 @@
             <a:pPr rtl="0"/>
             <a:fld id="{2FF95D3A-6098-4E79-BE61-296F9A23A1CB}" type="datetime1">
               <a:rPr lang="en-GB" noProof="0" smtClean="0"/>
-              <a:t>15/03/2024</a:t>
+              <a:t>17/03/2024</a:t>
             </a:fld>
             <a:endParaRPr lang="en-GB" noProof="0"/>
           </a:p>
@@ -4528,7 +4442,7 @@
             <a:pPr rtl="0"/>
             <a:fld id="{03CF9A9B-64FA-486B-B1C4-20B3C2842FAF}" type="datetime1">
               <a:rPr lang="en-GB" noProof="0" smtClean="0"/>
-              <a:t>15/03/2024</a:t>
+              <a:t>17/03/2024</a:t>
             </a:fld>
             <a:endParaRPr lang="en-GB" noProof="0"/>
           </a:p>
@@ -4965,7 +4879,7 @@
             <a:pPr rtl="0"/>
             <a:fld id="{8B9A1C3B-3411-4F1E-9257-FBE0BF08E35E}" type="datetime1">
               <a:rPr lang="en-GB" noProof="0" smtClean="0"/>
-              <a:t>15/03/2024</a:t>
+              <a:t>17/03/2024</a:t>
             </a:fld>
             <a:endParaRPr lang="en-GB" noProof="0"/>
           </a:p>
@@ -5082,7 +4996,7 @@
             <a:pPr rtl="0"/>
             <a:fld id="{6E7AE7EA-47F8-43A2-A0A9-1464253F1FF5}" type="datetime1">
               <a:rPr lang="en-GB" noProof="0" smtClean="0"/>
-              <a:t>15/03/2024</a:t>
+              <a:t>17/03/2024</a:t>
             </a:fld>
             <a:endParaRPr lang="en-GB" noProof="0"/>
           </a:p>
@@ -5175,7 +5089,7 @@
             <a:pPr rtl="0"/>
             <a:fld id="{8F3FAFEF-9964-4E62-A619-7F95A52237F8}" type="datetime1">
               <a:rPr lang="en-GB" noProof="0" smtClean="0"/>
-              <a:t>15/03/2024</a:t>
+              <a:t>17/03/2024</a:t>
             </a:fld>
             <a:endParaRPr lang="en-GB" noProof="0"/>
           </a:p>
@@ -5453,7 +5367,7 @@
             <a:pPr rtl="0"/>
             <a:fld id="{2583AF05-3F56-48E3-A521-2AA72E075177}" type="datetime1">
               <a:rPr lang="en-GB" noProof="0" smtClean="0"/>
-              <a:t>15/03/2024</a:t>
+              <a:t>17/03/2024</a:t>
             </a:fld>
             <a:endParaRPr lang="en-GB" noProof="0"/>
           </a:p>
@@ -5728,7 +5642,7 @@
             <a:pPr rtl="0"/>
             <a:fld id="{DC9ABC9C-6733-4B3C-8D3C-F33F0A5CEBCB}" type="datetime1">
               <a:rPr lang="en-GB" noProof="0" smtClean="0"/>
-              <a:t>15/03/2024</a:t>
+              <a:t>17/03/2024</a:t>
             </a:fld>
             <a:endParaRPr lang="en-GB" noProof="0"/>
           </a:p>
@@ -6156,7 +6070,7 @@
             <a:pPr rtl="0"/>
             <a:fld id="{05BD160B-B06D-4D6D-8099-7D9F4028ABFA}" type="datetime1">
               <a:rPr lang="en-GB" noProof="0" smtClean="0"/>
-              <a:t>15/03/2024</a:t>
+              <a:t>17/03/2024</a:t>
             </a:fld>
             <a:endParaRPr lang="en-GB" noProof="0"/>
           </a:p>
@@ -6641,30 +6555,6 @@
 <file path=ppt/slides/slide1.xml><?xml version="1.0" encoding="utf-8"?>
 <p:sld xmlns:a="http://schemas.openxmlformats.org/drawingml/2006/main" xmlns:r="http://schemas.openxmlformats.org/officeDocument/2006/relationships" xmlns:p="http://schemas.openxmlformats.org/presentationml/2006/main">
   <p:cSld>
-    <p:bg>
-      <p:bgPr>
-        <a:blipFill rotWithShape="1">
-          <a:blip r:embed="rId3">
-            <a:duotone>
-              <a:schemeClr val="bg2">
-                <a:shade val="62000"/>
-                <a:hueMod val="108000"/>
-                <a:satMod val="164000"/>
-                <a:lumMod val="69000"/>
-              </a:schemeClr>
-              <a:schemeClr val="bg2">
-                <a:tint val="96000"/>
-                <a:hueMod val="90000"/>
-                <a:satMod val="130000"/>
-                <a:lumMod val="134000"/>
-              </a:schemeClr>
-            </a:duotone>
-          </a:blip>
-          <a:stretch/>
-        </a:blipFill>
-        <a:effectLst/>
-      </p:bgPr>
-    </p:bg>
     <p:spTree>
       <p:nvGrpSpPr>
         <p:cNvPr id="1" name=""/>
@@ -6679,96 +6569,48 @@
           <a:chExt cx="0" cy="0"/>
         </a:xfrm>
       </p:grpSpPr>
-      <p:pic>
-        <p:nvPicPr>
-          <p:cNvPr id="5" name="Picture 4" descr="chain links">
+      <p:sp>
+        <p:nvSpPr>
+          <p:cNvPr id="2" name="Title 1">
             <a:extLst>
               <a:ext uri="{FF2B5EF4-FFF2-40B4-BE49-F238E27FC236}">
-                <a16:creationId xmlns:a16="http://schemas.microsoft.com/office/drawing/2014/main" id="{A4511EBC-2F3C-446D-867B-7DC328517A44}"/>
+                <a16:creationId xmlns:a16="http://schemas.microsoft.com/office/drawing/2014/main" id="{21107531-8BA4-9F58-4A87-64FFD8FE76A7}"/>
               </a:ext>
             </a:extLst>
           </p:cNvPr>
-          <p:cNvPicPr>
-            <a:picLocks noChangeAspect="1"/>
-          </p:cNvPicPr>
-          <p:nvPr/>
-        </p:nvPicPr>
-        <p:blipFill rotWithShape="1">
-          <a:blip r:embed="rId4">
-            <a:duotone>
-              <a:prstClr val="black"/>
-              <a:schemeClr val="accent5">
-                <a:tint val="45000"/>
-                <a:satMod val="400000"/>
-              </a:schemeClr>
-            </a:duotone>
-            <a:alphaModFix amt="25000"/>
-          </a:blip>
-          <a:srcRect t="23391" r="9091"/>
-          <a:stretch/>
-        </p:blipFill>
-        <p:spPr>
-          <a:xfrm>
-            <a:off x="20" y="10"/>
-            <a:ext cx="12191980" cy="6857990"/>
-          </a:xfrm>
-          <a:prstGeom prst="rect">
-            <a:avLst/>
-          </a:prstGeom>
-        </p:spPr>
-      </p:pic>
-      <p:sp>
-        <p:nvSpPr>
-          <p:cNvPr id="20" name="Rectangle 19">
+          <p:cNvSpPr>
+            <a:spLocks noGrp="1"/>
+          </p:cNvSpPr>
+          <p:nvPr>
+            <p:ph type="title"/>
+          </p:nvPr>
+        </p:nvSpPr>
+        <p:spPr/>
+        <p:txBody>
+          <a:bodyPr/>
+          <a:lstStyle/>
+          <a:p>
+            <a:endParaRPr lang="en-GB"/>
+          </a:p>
+        </p:txBody>
+      </p:sp>
+      <p:sp>
+        <p:nvSpPr>
+          <p:cNvPr id="3" name="Content Placeholder 2">
             <a:extLst>
               <a:ext uri="{FF2B5EF4-FFF2-40B4-BE49-F238E27FC236}">
-                <a16:creationId xmlns:a16="http://schemas.microsoft.com/office/drawing/2014/main" id="{318E9D62-7BA3-4D5E-8915-0D0E8661E3D7}"/>
-              </a:ext>
-              <a:ext uri="{C183D7F6-B498-43B3-948B-1728B52AA6E4}">
-                <adec:decorative xmlns:adec="http://schemas.microsoft.com/office/drawing/2017/decorative" val="1"/>
+                <a16:creationId xmlns:a16="http://schemas.microsoft.com/office/drawing/2014/main" id="{A241D88D-3F77-B44F-06C4-BAF26001964B}"/>
               </a:ext>
             </a:extLst>
           </p:cNvPr>
           <p:cNvSpPr>
-            <a:spLocks noGrp="1" noRot="1" noChangeAspect="1" noMove="1" noResize="1" noEditPoints="1" noAdjustHandles="1" noChangeArrowheads="1" noChangeShapeType="1" noTextEdit="1"/>
-          </p:cNvSpPr>
-          <p:nvPr>
-            <p:extLst>
-              <p:ext uri="{386F3935-93C4-4BCD-93E2-E3B085C9AB24}">
-                <p16:designElem xmlns:p16="http://schemas.microsoft.com/office/powerpoint/2015/main" val="1"/>
-              </p:ext>
-            </p:extLst>
-          </p:nvPr>
-        </p:nvSpPr>
-        <p:spPr>
-          <a:xfrm>
-            <a:off x="10437812" y="0"/>
-            <a:ext cx="685800" cy="1143000"/>
-          </a:xfrm>
-          <a:prstGeom prst="rect">
-            <a:avLst/>
-          </a:prstGeom>
-          <a:solidFill>
-            <a:schemeClr val="accent1"/>
-          </a:solidFill>
-          <a:ln>
-            <a:noFill/>
-          </a:ln>
-        </p:spPr>
-        <p:style>
-          <a:lnRef idx="1">
-            <a:schemeClr val="accent1"/>
-          </a:lnRef>
-          <a:fillRef idx="3">
-            <a:schemeClr val="accent1"/>
-          </a:fillRef>
-          <a:effectRef idx="2">
-            <a:schemeClr val="accent1"/>
-          </a:effectRef>
-          <a:fontRef idx="minor">
-            <a:schemeClr val="lt1"/>
-          </a:fontRef>
-        </p:style>
+            <a:spLocks noGrp="1"/>
+          </p:cNvSpPr>
+          <p:nvPr>
+            <p:ph idx="1"/>
+          </p:nvPr>
+        </p:nvSpPr>
+        <p:spPr/>
         <p:txBody>
           <a:bodyPr/>
           <a:lstStyle/>
@@ -6780,7 +6622,7 @@
     </p:spTree>
     <p:extLst>
       <p:ext uri="{BB962C8B-B14F-4D97-AF65-F5344CB8AC3E}">
-        <p14:creationId xmlns:p14="http://schemas.microsoft.com/office/powerpoint/2010/main" val="193000927"/>
+        <p14:creationId xmlns:p14="http://schemas.microsoft.com/office/powerpoint/2010/main" val="3545898188"/>
       </p:ext>
     </p:extLst>
   </p:cSld>
@@ -7646,12 +7488,12 @@
 </file>
 
 <file path=customXml/item1.xml><?xml version="1.0" encoding="utf-8"?>
-<?mso-contentType ?>
-<FormTemplates xmlns="http://schemas.microsoft.com/sharepoint/v3/contenttype/forms">
-  <Display>DocumentLibraryForm</Display>
-  <Edit>DocumentLibraryForm</Edit>
-  <New>DocumentLibraryForm</New>
-</FormTemplates>
+<p:properties xmlns:p="http://schemas.microsoft.com/office/2006/metadata/properties" xmlns:xsi="http://www.w3.org/2001/XMLSchema-instance" xmlns:pc="http://schemas.microsoft.com/office/infopath/2007/PartnerControls">
+  <documentManagement>
+    <Status xmlns="71af3243-3dd4-4a8d-8c0d-dd76da1f02a5">Not started</Status>
+    <MediaServiceKeyPoints xmlns="71af3243-3dd4-4a8d-8c0d-dd76da1f02a5" xsi:nil="true"/>
+  </documentManagement>
+</p:properties>
 </file>
 
 <file path=customXml/item2.xml><?xml version="1.0" encoding="utf-8"?>
@@ -7876,18 +7718,20 @@
 </file>
 
 <file path=customXml/item3.xml><?xml version="1.0" encoding="utf-8"?>
-<p:properties xmlns:p="http://schemas.microsoft.com/office/2006/metadata/properties" xmlns:xsi="http://www.w3.org/2001/XMLSchema-instance" xmlns:pc="http://schemas.microsoft.com/office/infopath/2007/PartnerControls">
-  <documentManagement>
-    <Status xmlns="71af3243-3dd4-4a8d-8c0d-dd76da1f02a5">Not started</Status>
-    <MediaServiceKeyPoints xmlns="71af3243-3dd4-4a8d-8c0d-dd76da1f02a5" xsi:nil="true"/>
-  </documentManagement>
-</p:properties>
+<?mso-contentType ?>
+<FormTemplates xmlns="http://schemas.microsoft.com/sharepoint/v3/contenttype/forms">
+  <Display>DocumentLibraryForm</Display>
+  <Edit>DocumentLibraryForm</Edit>
+  <New>DocumentLibraryForm</New>
+</FormTemplates>
 </file>
 
 <file path=customXml/itemProps1.xml><?xml version="1.0" encoding="utf-8"?>
-<ds:datastoreItem xmlns:ds="http://schemas.openxmlformats.org/officeDocument/2006/customXml" ds:itemID="{0D16958A-754B-4396-9457-FD7A427A37DD}">
+<ds:datastoreItem xmlns:ds="http://schemas.openxmlformats.org/officeDocument/2006/customXml" ds:itemID="{048C88F1-1664-415F-AFCE-F6CF45809817}">
   <ds:schemaRefs>
-    <ds:schemaRef ds:uri="http://schemas.microsoft.com/sharepoint/v3/contenttype/forms"/>
+    <ds:schemaRef ds:uri="http://schemas.microsoft.com/office/2006/metadata/properties"/>
+    <ds:schemaRef ds:uri="http://schemas.microsoft.com/office/infopath/2007/PartnerControls"/>
+    <ds:schemaRef ds:uri="71af3243-3dd4-4a8d-8c0d-dd76da1f02a5"/>
   </ds:schemaRefs>
 </ds:datastoreItem>
 </file>
@@ -7912,11 +7756,9 @@
 </file>
 
 <file path=customXml/itemProps3.xml><?xml version="1.0" encoding="utf-8"?>
-<ds:datastoreItem xmlns:ds="http://schemas.openxmlformats.org/officeDocument/2006/customXml" ds:itemID="{048C88F1-1664-415F-AFCE-F6CF45809817}">
+<ds:datastoreItem xmlns:ds="http://schemas.openxmlformats.org/officeDocument/2006/customXml" ds:itemID="{0D16958A-754B-4396-9457-FD7A427A37DD}">
   <ds:schemaRefs>
-    <ds:schemaRef ds:uri="http://schemas.microsoft.com/office/2006/metadata/properties"/>
-    <ds:schemaRef ds:uri="http://schemas.microsoft.com/office/infopath/2007/PartnerControls"/>
-    <ds:schemaRef ds:uri="71af3243-3dd4-4a8d-8c0d-dd76da1f02a5"/>
+    <ds:schemaRef ds:uri="http://schemas.microsoft.com/sharepoint/v3/contenttype/forms"/>
   </ds:schemaRefs>
 </ds:datastoreItem>
 </file>
</xml_diff>